<commit_message>
fixed faults of the recommendation algorithm
</commit_message>
<xml_diff>
--- a/uxDesign/Flutter_UX.pptx
+++ b/uxDesign/Flutter_UX.pptx
@@ -7,6 +7,7 @@
   <p:sldIdLst>
     <p:sldId id="256" r:id="rId2"/>
     <p:sldId id="257" r:id="rId3"/>
+    <p:sldId id="258" r:id="rId4"/>
   </p:sldIdLst>
   <p:sldSz cx="12192000" cy="6858000"/>
   <p:notesSz cx="6858000" cy="9144000"/>
@@ -105,6 +106,11 @@
       </a:defRPr>
     </a:lvl9pPr>
   </p:defaultTextStyle>
+  <p:extLst>
+    <p:ext uri="{EFAFB233-063F-42B5-8137-9DF3F51BA10A}">
+      <p15:sldGuideLst xmlns:p15="http://schemas.microsoft.com/office/powerpoint/2012/main"/>
+    </p:ext>
+  </p:extLst>
 </p:presentation>
 </file>
 
@@ -255,7 +261,7 @@
           <a:p>
             <a:fld id="{7F5A8230-97C9-4541-A2E8-E850EA592270}" type="datetimeFigureOut">
               <a:rPr lang="ko-KR" altLang="en-US" smtClean="0"/>
-              <a:t>2025-01-03</a:t>
+              <a:t>2025-02-14</a:t>
             </a:fld>
             <a:endParaRPr lang="ko-KR" altLang="en-US"/>
           </a:p>
@@ -453,7 +459,7 @@
           <a:p>
             <a:fld id="{7F5A8230-97C9-4541-A2E8-E850EA592270}" type="datetimeFigureOut">
               <a:rPr lang="ko-KR" altLang="en-US" smtClean="0"/>
-              <a:t>2025-01-03</a:t>
+              <a:t>2025-02-14</a:t>
             </a:fld>
             <a:endParaRPr lang="ko-KR" altLang="en-US"/>
           </a:p>
@@ -661,7 +667,7 @@
           <a:p>
             <a:fld id="{7F5A8230-97C9-4541-A2E8-E850EA592270}" type="datetimeFigureOut">
               <a:rPr lang="ko-KR" altLang="en-US" smtClean="0"/>
-              <a:t>2025-01-03</a:t>
+              <a:t>2025-02-14</a:t>
             </a:fld>
             <a:endParaRPr lang="ko-KR" altLang="en-US"/>
           </a:p>
@@ -859,7 +865,7 @@
           <a:p>
             <a:fld id="{7F5A8230-97C9-4541-A2E8-E850EA592270}" type="datetimeFigureOut">
               <a:rPr lang="ko-KR" altLang="en-US" smtClean="0"/>
-              <a:t>2025-01-03</a:t>
+              <a:t>2025-02-14</a:t>
             </a:fld>
             <a:endParaRPr lang="ko-KR" altLang="en-US"/>
           </a:p>
@@ -1134,7 +1140,7 @@
           <a:p>
             <a:fld id="{7F5A8230-97C9-4541-A2E8-E850EA592270}" type="datetimeFigureOut">
               <a:rPr lang="ko-KR" altLang="en-US" smtClean="0"/>
-              <a:t>2025-01-03</a:t>
+              <a:t>2025-02-14</a:t>
             </a:fld>
             <a:endParaRPr lang="ko-KR" altLang="en-US"/>
           </a:p>
@@ -1399,7 +1405,7 @@
           <a:p>
             <a:fld id="{7F5A8230-97C9-4541-A2E8-E850EA592270}" type="datetimeFigureOut">
               <a:rPr lang="ko-KR" altLang="en-US" smtClean="0"/>
-              <a:t>2025-01-03</a:t>
+              <a:t>2025-02-14</a:t>
             </a:fld>
             <a:endParaRPr lang="ko-KR" altLang="en-US"/>
           </a:p>
@@ -1811,7 +1817,7 @@
           <a:p>
             <a:fld id="{7F5A8230-97C9-4541-A2E8-E850EA592270}" type="datetimeFigureOut">
               <a:rPr lang="ko-KR" altLang="en-US" smtClean="0"/>
-              <a:t>2025-01-03</a:t>
+              <a:t>2025-02-14</a:t>
             </a:fld>
             <a:endParaRPr lang="ko-KR" altLang="en-US"/>
           </a:p>
@@ -1952,7 +1958,7 @@
           <a:p>
             <a:fld id="{7F5A8230-97C9-4541-A2E8-E850EA592270}" type="datetimeFigureOut">
               <a:rPr lang="ko-KR" altLang="en-US" smtClean="0"/>
-              <a:t>2025-01-03</a:t>
+              <a:t>2025-02-14</a:t>
             </a:fld>
             <a:endParaRPr lang="ko-KR" altLang="en-US"/>
           </a:p>
@@ -2065,7 +2071,7 @@
           <a:p>
             <a:fld id="{7F5A8230-97C9-4541-A2E8-E850EA592270}" type="datetimeFigureOut">
               <a:rPr lang="ko-KR" altLang="en-US" smtClean="0"/>
-              <a:t>2025-01-03</a:t>
+              <a:t>2025-02-14</a:t>
             </a:fld>
             <a:endParaRPr lang="ko-KR" altLang="en-US"/>
           </a:p>
@@ -2376,7 +2382,7 @@
           <a:p>
             <a:fld id="{7F5A8230-97C9-4541-A2E8-E850EA592270}" type="datetimeFigureOut">
               <a:rPr lang="ko-KR" altLang="en-US" smtClean="0"/>
-              <a:t>2025-01-03</a:t>
+              <a:t>2025-02-14</a:t>
             </a:fld>
             <a:endParaRPr lang="ko-KR" altLang="en-US"/>
           </a:p>
@@ -2664,7 +2670,7 @@
           <a:p>
             <a:fld id="{7F5A8230-97C9-4541-A2E8-E850EA592270}" type="datetimeFigureOut">
               <a:rPr lang="ko-KR" altLang="en-US" smtClean="0"/>
-              <a:t>2025-01-03</a:t>
+              <a:t>2025-02-14</a:t>
             </a:fld>
             <a:endParaRPr lang="ko-KR" altLang="en-US"/>
           </a:p>
@@ -2905,7 +2911,7 @@
           <a:p>
             <a:fld id="{7F5A8230-97C9-4541-A2E8-E850EA592270}" type="datetimeFigureOut">
               <a:rPr lang="ko-KR" altLang="en-US" smtClean="0"/>
-              <a:t>2025-01-03</a:t>
+              <a:t>2025-02-14</a:t>
             </a:fld>
             <a:endParaRPr lang="ko-KR" altLang="en-US"/>
           </a:p>
@@ -4375,6 +4381,656 @@
     <p:extLst>
       <p:ext uri="{BB962C8B-B14F-4D97-AF65-F5344CB8AC3E}">
         <p14:creationId xmlns:p14="http://schemas.microsoft.com/office/powerpoint/2010/main" val="128267718"/>
+      </p:ext>
+    </p:extLst>
+  </p:cSld>
+  <p:clrMapOvr>
+    <a:masterClrMapping/>
+  </p:clrMapOvr>
+</p:sld>
+</file>
+
+<file path=ppt/slides/slide3.xml><?xml version="1.0" encoding="utf-8"?>
+<p:sld xmlns:a="http://schemas.openxmlformats.org/drawingml/2006/main" xmlns:r="http://schemas.openxmlformats.org/officeDocument/2006/relationships" xmlns:p="http://schemas.openxmlformats.org/presentationml/2006/main">
+  <p:cSld>
+    <p:spTree>
+      <p:nvGrpSpPr>
+        <p:cNvPr id="1" name=""/>
+        <p:cNvGrpSpPr/>
+        <p:nvPr/>
+      </p:nvGrpSpPr>
+      <p:grpSpPr>
+        <a:xfrm>
+          <a:off x="0" y="0"/>
+          <a:ext cx="0" cy="0"/>
+          <a:chOff x="0" y="0"/>
+          <a:chExt cx="0" cy="0"/>
+        </a:xfrm>
+      </p:grpSpPr>
+      <p:sp>
+        <p:nvSpPr>
+          <p:cNvPr id="4" name="사각형: 둥근 모서리 3">
+            <a:extLst>
+              <a:ext uri="{FF2B5EF4-FFF2-40B4-BE49-F238E27FC236}">
+                <a16:creationId xmlns:a16="http://schemas.microsoft.com/office/drawing/2014/main" id="{205410B6-2E14-B6CF-3EBC-2E0320537E67}"/>
+              </a:ext>
+            </a:extLst>
+          </p:cNvPr>
+          <p:cNvSpPr/>
+          <p:nvPr/>
+        </p:nvSpPr>
+        <p:spPr>
+          <a:xfrm>
+            <a:off x="3142593" y="893379"/>
+            <a:ext cx="3069021" cy="861849"/>
+          </a:xfrm>
+          <a:prstGeom prst="roundRect">
+            <a:avLst/>
+          </a:prstGeom>
+        </p:spPr>
+        <p:style>
+          <a:lnRef idx="1">
+            <a:schemeClr val="accent6"/>
+          </a:lnRef>
+          <a:fillRef idx="2">
+            <a:schemeClr val="accent6"/>
+          </a:fillRef>
+          <a:effectRef idx="1">
+            <a:schemeClr val="accent6"/>
+          </a:effectRef>
+          <a:fontRef idx="minor">
+            <a:schemeClr val="dk1"/>
+          </a:fontRef>
+        </p:style>
+        <p:txBody>
+          <a:bodyPr rtlCol="0" anchor="ctr"/>
+          <a:lstStyle/>
+          <a:p>
+            <a:pPr algn="ctr"/>
+            <a:endParaRPr lang="ko-KR" altLang="en-US"/>
+          </a:p>
+        </p:txBody>
+      </p:sp>
+      <p:sp>
+        <p:nvSpPr>
+          <p:cNvPr id="5" name="사각형: 둥근 모서리 4">
+            <a:extLst>
+              <a:ext uri="{FF2B5EF4-FFF2-40B4-BE49-F238E27FC236}">
+                <a16:creationId xmlns:a16="http://schemas.microsoft.com/office/drawing/2014/main" id="{14F1E0F8-56AC-DC9A-F389-2CF06B5A0761}"/>
+              </a:ext>
+            </a:extLst>
+          </p:cNvPr>
+          <p:cNvSpPr/>
+          <p:nvPr/>
+        </p:nvSpPr>
+        <p:spPr>
+          <a:xfrm>
+            <a:off x="3300248" y="972206"/>
+            <a:ext cx="704193" cy="704193"/>
+          </a:xfrm>
+          <a:prstGeom prst="roundRect">
+            <a:avLst/>
+          </a:prstGeom>
+        </p:spPr>
+        <p:style>
+          <a:lnRef idx="2">
+            <a:schemeClr val="accent6"/>
+          </a:lnRef>
+          <a:fillRef idx="1">
+            <a:schemeClr val="lt1"/>
+          </a:fillRef>
+          <a:effectRef idx="0">
+            <a:schemeClr val="accent6"/>
+          </a:effectRef>
+          <a:fontRef idx="minor">
+            <a:schemeClr val="dk1"/>
+          </a:fontRef>
+        </p:style>
+        <p:txBody>
+          <a:bodyPr rtlCol="0" anchor="ctr"/>
+          <a:lstStyle/>
+          <a:p>
+            <a:pPr algn="ctr"/>
+            <a:endParaRPr lang="ko-KR" altLang="en-US"/>
+          </a:p>
+        </p:txBody>
+      </p:sp>
+      <p:pic>
+        <p:nvPicPr>
+          <p:cNvPr id="7" name="그래픽 6" descr="약 단색으로 채워진">
+            <a:extLst>
+              <a:ext uri="{FF2B5EF4-FFF2-40B4-BE49-F238E27FC236}">
+                <a16:creationId xmlns:a16="http://schemas.microsoft.com/office/drawing/2014/main" id="{2953F5C2-F771-FE02-EF26-DC4D245B856A}"/>
+              </a:ext>
+            </a:extLst>
+          </p:cNvPr>
+          <p:cNvPicPr>
+            <a:picLocks noChangeAspect="1"/>
+          </p:cNvPicPr>
+          <p:nvPr/>
+        </p:nvPicPr>
+        <p:blipFill>
+          <a:blip r:embed="rId2">
+            <a:extLst>
+              <a:ext uri="{96DAC541-7B7A-43D3-8B79-37D633B846F1}">
+                <asvg:svgBlip xmlns:asvg="http://schemas.microsoft.com/office/drawing/2016/SVG/main" r:embed="rId3"/>
+              </a:ext>
+            </a:extLst>
+          </a:blip>
+          <a:stretch>
+            <a:fillRect/>
+          </a:stretch>
+        </p:blipFill>
+        <p:spPr>
+          <a:xfrm>
+            <a:off x="3365937" y="1037895"/>
+            <a:ext cx="572814" cy="572814"/>
+          </a:xfrm>
+          <a:prstGeom prst="rect">
+            <a:avLst/>
+          </a:prstGeom>
+        </p:spPr>
+      </p:pic>
+      <p:sp>
+        <p:nvSpPr>
+          <p:cNvPr id="8" name="사각형: 둥근 모서리 7">
+            <a:extLst>
+              <a:ext uri="{FF2B5EF4-FFF2-40B4-BE49-F238E27FC236}">
+                <a16:creationId xmlns:a16="http://schemas.microsoft.com/office/drawing/2014/main" id="{B5D47003-50D0-422A-F740-80A7C535982B}"/>
+              </a:ext>
+            </a:extLst>
+          </p:cNvPr>
+          <p:cNvSpPr/>
+          <p:nvPr/>
+        </p:nvSpPr>
+        <p:spPr>
+          <a:xfrm>
+            <a:off x="3142593" y="2033751"/>
+            <a:ext cx="3069021" cy="861849"/>
+          </a:xfrm>
+          <a:prstGeom prst="roundRect">
+            <a:avLst/>
+          </a:prstGeom>
+        </p:spPr>
+        <p:style>
+          <a:lnRef idx="1">
+            <a:schemeClr val="accent4"/>
+          </a:lnRef>
+          <a:fillRef idx="2">
+            <a:schemeClr val="accent4"/>
+          </a:fillRef>
+          <a:effectRef idx="1">
+            <a:schemeClr val="accent4"/>
+          </a:effectRef>
+          <a:fontRef idx="minor">
+            <a:schemeClr val="dk1"/>
+          </a:fontRef>
+        </p:style>
+        <p:txBody>
+          <a:bodyPr rtlCol="0" anchor="ctr"/>
+          <a:lstStyle/>
+          <a:p>
+            <a:pPr algn="ctr"/>
+            <a:endParaRPr lang="ko-KR" altLang="en-US"/>
+          </a:p>
+        </p:txBody>
+      </p:sp>
+      <p:sp>
+        <p:nvSpPr>
+          <p:cNvPr id="9" name="사각형: 둥근 모서리 8">
+            <a:extLst>
+              <a:ext uri="{FF2B5EF4-FFF2-40B4-BE49-F238E27FC236}">
+                <a16:creationId xmlns:a16="http://schemas.microsoft.com/office/drawing/2014/main" id="{FCA49D66-97E3-DD49-E628-034C684989CD}"/>
+              </a:ext>
+            </a:extLst>
+          </p:cNvPr>
+          <p:cNvSpPr/>
+          <p:nvPr/>
+        </p:nvSpPr>
+        <p:spPr>
+          <a:xfrm>
+            <a:off x="3300248" y="2112578"/>
+            <a:ext cx="704193" cy="704193"/>
+          </a:xfrm>
+          <a:prstGeom prst="roundRect">
+            <a:avLst/>
+          </a:prstGeom>
+        </p:spPr>
+        <p:style>
+          <a:lnRef idx="2">
+            <a:schemeClr val="accent6"/>
+          </a:lnRef>
+          <a:fillRef idx="1">
+            <a:schemeClr val="lt1"/>
+          </a:fillRef>
+          <a:effectRef idx="0">
+            <a:schemeClr val="accent6"/>
+          </a:effectRef>
+          <a:fontRef idx="minor">
+            <a:schemeClr val="dk1"/>
+          </a:fontRef>
+        </p:style>
+        <p:txBody>
+          <a:bodyPr rtlCol="0" anchor="ctr"/>
+          <a:lstStyle/>
+          <a:p>
+            <a:pPr algn="ctr"/>
+            <a:endParaRPr lang="ko-KR" altLang="en-US"/>
+          </a:p>
+        </p:txBody>
+      </p:sp>
+      <p:pic>
+        <p:nvPicPr>
+          <p:cNvPr id="10" name="그래픽 9" descr="약 단색으로 채워진">
+            <a:extLst>
+              <a:ext uri="{FF2B5EF4-FFF2-40B4-BE49-F238E27FC236}">
+                <a16:creationId xmlns:a16="http://schemas.microsoft.com/office/drawing/2014/main" id="{833B8CE2-4B56-E9A9-EC4E-F76516D3E327}"/>
+              </a:ext>
+            </a:extLst>
+          </p:cNvPr>
+          <p:cNvPicPr>
+            <a:picLocks noChangeAspect="1"/>
+          </p:cNvPicPr>
+          <p:nvPr/>
+        </p:nvPicPr>
+        <p:blipFill>
+          <a:blip r:embed="rId2">
+            <a:extLst>
+              <a:ext uri="{96DAC541-7B7A-43D3-8B79-37D633B846F1}">
+                <asvg:svgBlip xmlns:asvg="http://schemas.microsoft.com/office/drawing/2016/SVG/main" r:embed="rId3"/>
+              </a:ext>
+            </a:extLst>
+          </a:blip>
+          <a:stretch>
+            <a:fillRect/>
+          </a:stretch>
+        </p:blipFill>
+        <p:spPr>
+          <a:xfrm>
+            <a:off x="3365937" y="2178267"/>
+            <a:ext cx="572814" cy="572814"/>
+          </a:xfrm>
+          <a:prstGeom prst="rect">
+            <a:avLst/>
+          </a:prstGeom>
+        </p:spPr>
+      </p:pic>
+      <p:sp>
+        <p:nvSpPr>
+          <p:cNvPr id="11" name="사각형: 둥근 모서리 10">
+            <a:extLst>
+              <a:ext uri="{FF2B5EF4-FFF2-40B4-BE49-F238E27FC236}">
+                <a16:creationId xmlns:a16="http://schemas.microsoft.com/office/drawing/2014/main" id="{9FAFC673-85D5-E200-6975-5FC0E6F93CA3}"/>
+              </a:ext>
+            </a:extLst>
+          </p:cNvPr>
+          <p:cNvSpPr/>
+          <p:nvPr/>
+        </p:nvSpPr>
+        <p:spPr>
+          <a:xfrm>
+            <a:off x="3142593" y="3179381"/>
+            <a:ext cx="3069021" cy="861849"/>
+          </a:xfrm>
+          <a:prstGeom prst="roundRect">
+            <a:avLst/>
+          </a:prstGeom>
+        </p:spPr>
+        <p:style>
+          <a:lnRef idx="1">
+            <a:schemeClr val="accent2"/>
+          </a:lnRef>
+          <a:fillRef idx="2">
+            <a:schemeClr val="accent2"/>
+          </a:fillRef>
+          <a:effectRef idx="1">
+            <a:schemeClr val="accent2"/>
+          </a:effectRef>
+          <a:fontRef idx="minor">
+            <a:schemeClr val="dk1"/>
+          </a:fontRef>
+        </p:style>
+        <p:txBody>
+          <a:bodyPr rtlCol="0" anchor="ctr"/>
+          <a:lstStyle/>
+          <a:p>
+            <a:pPr algn="ctr"/>
+            <a:endParaRPr lang="ko-KR" altLang="en-US"/>
+          </a:p>
+        </p:txBody>
+      </p:sp>
+      <p:sp>
+        <p:nvSpPr>
+          <p:cNvPr id="12" name="사각형: 둥근 모서리 11">
+            <a:extLst>
+              <a:ext uri="{FF2B5EF4-FFF2-40B4-BE49-F238E27FC236}">
+                <a16:creationId xmlns:a16="http://schemas.microsoft.com/office/drawing/2014/main" id="{D2D1388C-A33E-B9BC-A33F-257D7960DEA4}"/>
+              </a:ext>
+            </a:extLst>
+          </p:cNvPr>
+          <p:cNvSpPr/>
+          <p:nvPr/>
+        </p:nvSpPr>
+        <p:spPr>
+          <a:xfrm>
+            <a:off x="3300248" y="3258208"/>
+            <a:ext cx="704193" cy="704193"/>
+          </a:xfrm>
+          <a:prstGeom prst="roundRect">
+            <a:avLst/>
+          </a:prstGeom>
+        </p:spPr>
+        <p:style>
+          <a:lnRef idx="2">
+            <a:schemeClr val="accent6"/>
+          </a:lnRef>
+          <a:fillRef idx="1">
+            <a:schemeClr val="lt1"/>
+          </a:fillRef>
+          <a:effectRef idx="0">
+            <a:schemeClr val="accent6"/>
+          </a:effectRef>
+          <a:fontRef idx="minor">
+            <a:schemeClr val="dk1"/>
+          </a:fontRef>
+        </p:style>
+        <p:txBody>
+          <a:bodyPr rtlCol="0" anchor="ctr"/>
+          <a:lstStyle/>
+          <a:p>
+            <a:pPr algn="ctr"/>
+            <a:endParaRPr lang="ko-KR" altLang="en-US"/>
+          </a:p>
+        </p:txBody>
+      </p:sp>
+      <p:pic>
+        <p:nvPicPr>
+          <p:cNvPr id="13" name="그래픽 12" descr="약 단색으로 채워진">
+            <a:extLst>
+              <a:ext uri="{FF2B5EF4-FFF2-40B4-BE49-F238E27FC236}">
+                <a16:creationId xmlns:a16="http://schemas.microsoft.com/office/drawing/2014/main" id="{D38B50E3-13E3-3E31-3EE5-1252A98D7686}"/>
+              </a:ext>
+            </a:extLst>
+          </p:cNvPr>
+          <p:cNvPicPr>
+            <a:picLocks noChangeAspect="1"/>
+          </p:cNvPicPr>
+          <p:nvPr/>
+        </p:nvPicPr>
+        <p:blipFill>
+          <a:blip r:embed="rId2">
+            <a:extLst>
+              <a:ext uri="{96DAC541-7B7A-43D3-8B79-37D633B846F1}">
+                <asvg:svgBlip xmlns:asvg="http://schemas.microsoft.com/office/drawing/2016/SVG/main" r:embed="rId3"/>
+              </a:ext>
+            </a:extLst>
+          </a:blip>
+          <a:stretch>
+            <a:fillRect/>
+          </a:stretch>
+        </p:blipFill>
+        <p:spPr>
+          <a:xfrm>
+            <a:off x="3365937" y="3323897"/>
+            <a:ext cx="572814" cy="572814"/>
+          </a:xfrm>
+          <a:prstGeom prst="rect">
+            <a:avLst/>
+          </a:prstGeom>
+        </p:spPr>
+      </p:pic>
+      <p:sp>
+        <p:nvSpPr>
+          <p:cNvPr id="14" name="사각형: 둥근 모서리 13">
+            <a:extLst>
+              <a:ext uri="{FF2B5EF4-FFF2-40B4-BE49-F238E27FC236}">
+                <a16:creationId xmlns:a16="http://schemas.microsoft.com/office/drawing/2014/main" id="{28DDF091-508F-1787-33B1-512A64649BEE}"/>
+              </a:ext>
+            </a:extLst>
+          </p:cNvPr>
+          <p:cNvSpPr/>
+          <p:nvPr/>
+        </p:nvSpPr>
+        <p:spPr>
+          <a:xfrm>
+            <a:off x="3142593" y="4325011"/>
+            <a:ext cx="3069021" cy="861849"/>
+          </a:xfrm>
+          <a:prstGeom prst="roundRect">
+            <a:avLst/>
+          </a:prstGeom>
+        </p:spPr>
+        <p:style>
+          <a:lnRef idx="1">
+            <a:schemeClr val="accent6"/>
+          </a:lnRef>
+          <a:fillRef idx="2">
+            <a:schemeClr val="accent6"/>
+          </a:fillRef>
+          <a:effectRef idx="1">
+            <a:schemeClr val="accent6"/>
+          </a:effectRef>
+          <a:fontRef idx="minor">
+            <a:schemeClr val="dk1"/>
+          </a:fontRef>
+        </p:style>
+        <p:txBody>
+          <a:bodyPr rtlCol="0" anchor="ctr"/>
+          <a:lstStyle/>
+          <a:p>
+            <a:pPr algn="ctr"/>
+            <a:endParaRPr lang="ko-KR" altLang="en-US"/>
+          </a:p>
+        </p:txBody>
+      </p:sp>
+      <p:sp>
+        <p:nvSpPr>
+          <p:cNvPr id="15" name="사각형: 둥근 모서리 14">
+            <a:extLst>
+              <a:ext uri="{FF2B5EF4-FFF2-40B4-BE49-F238E27FC236}">
+                <a16:creationId xmlns:a16="http://schemas.microsoft.com/office/drawing/2014/main" id="{B873D11F-915C-BC7B-773E-6A5ED0BEDE3A}"/>
+              </a:ext>
+            </a:extLst>
+          </p:cNvPr>
+          <p:cNvSpPr/>
+          <p:nvPr/>
+        </p:nvSpPr>
+        <p:spPr>
+          <a:xfrm>
+            <a:off x="3300248" y="4403838"/>
+            <a:ext cx="704193" cy="704193"/>
+          </a:xfrm>
+          <a:prstGeom prst="roundRect">
+            <a:avLst/>
+          </a:prstGeom>
+        </p:spPr>
+        <p:style>
+          <a:lnRef idx="2">
+            <a:schemeClr val="accent6"/>
+          </a:lnRef>
+          <a:fillRef idx="1">
+            <a:schemeClr val="lt1"/>
+          </a:fillRef>
+          <a:effectRef idx="0">
+            <a:schemeClr val="accent6"/>
+          </a:effectRef>
+          <a:fontRef idx="minor">
+            <a:schemeClr val="dk1"/>
+          </a:fontRef>
+        </p:style>
+        <p:txBody>
+          <a:bodyPr rtlCol="0" anchor="ctr"/>
+          <a:lstStyle/>
+          <a:p>
+            <a:pPr algn="ctr"/>
+            <a:endParaRPr lang="ko-KR" altLang="en-US"/>
+          </a:p>
+        </p:txBody>
+      </p:sp>
+      <p:pic>
+        <p:nvPicPr>
+          <p:cNvPr id="16" name="그래픽 15" descr="약 단색으로 채워진">
+            <a:extLst>
+              <a:ext uri="{FF2B5EF4-FFF2-40B4-BE49-F238E27FC236}">
+                <a16:creationId xmlns:a16="http://schemas.microsoft.com/office/drawing/2014/main" id="{77312DDB-5628-7F46-EFFE-C309BDDBA6FB}"/>
+              </a:ext>
+            </a:extLst>
+          </p:cNvPr>
+          <p:cNvPicPr>
+            <a:picLocks noChangeAspect="1"/>
+          </p:cNvPicPr>
+          <p:nvPr/>
+        </p:nvPicPr>
+        <p:blipFill>
+          <a:blip r:embed="rId2">
+            <a:extLst>
+              <a:ext uri="{96DAC541-7B7A-43D3-8B79-37D633B846F1}">
+                <asvg:svgBlip xmlns:asvg="http://schemas.microsoft.com/office/drawing/2016/SVG/main" r:embed="rId3"/>
+              </a:ext>
+            </a:extLst>
+          </a:blip>
+          <a:stretch>
+            <a:fillRect/>
+          </a:stretch>
+        </p:blipFill>
+        <p:spPr>
+          <a:xfrm>
+            <a:off x="3365937" y="4469527"/>
+            <a:ext cx="572814" cy="572814"/>
+          </a:xfrm>
+          <a:prstGeom prst="rect">
+            <a:avLst/>
+          </a:prstGeom>
+        </p:spPr>
+      </p:pic>
+      <p:sp>
+        <p:nvSpPr>
+          <p:cNvPr id="17" name="사각형: 둥근 모서리 16">
+            <a:extLst>
+              <a:ext uri="{FF2B5EF4-FFF2-40B4-BE49-F238E27FC236}">
+                <a16:creationId xmlns:a16="http://schemas.microsoft.com/office/drawing/2014/main" id="{14550EEE-326A-ABA8-2B73-BCEA1810A2C3}"/>
+              </a:ext>
+            </a:extLst>
+          </p:cNvPr>
+          <p:cNvSpPr/>
+          <p:nvPr/>
+        </p:nvSpPr>
+        <p:spPr>
+          <a:xfrm>
+            <a:off x="3142593" y="5470641"/>
+            <a:ext cx="3069021" cy="861849"/>
+          </a:xfrm>
+          <a:prstGeom prst="roundRect">
+            <a:avLst/>
+          </a:prstGeom>
+        </p:spPr>
+        <p:style>
+          <a:lnRef idx="1">
+            <a:schemeClr val="accent4"/>
+          </a:lnRef>
+          <a:fillRef idx="2">
+            <a:schemeClr val="accent4"/>
+          </a:fillRef>
+          <a:effectRef idx="1">
+            <a:schemeClr val="accent4"/>
+          </a:effectRef>
+          <a:fontRef idx="minor">
+            <a:schemeClr val="dk1"/>
+          </a:fontRef>
+        </p:style>
+        <p:txBody>
+          <a:bodyPr rtlCol="0" anchor="ctr"/>
+          <a:lstStyle/>
+          <a:p>
+            <a:pPr algn="ctr"/>
+            <a:endParaRPr lang="ko-KR" altLang="en-US"/>
+          </a:p>
+        </p:txBody>
+      </p:sp>
+      <p:sp>
+        <p:nvSpPr>
+          <p:cNvPr id="18" name="사각형: 둥근 모서리 17">
+            <a:extLst>
+              <a:ext uri="{FF2B5EF4-FFF2-40B4-BE49-F238E27FC236}">
+                <a16:creationId xmlns:a16="http://schemas.microsoft.com/office/drawing/2014/main" id="{5855A23F-1BE2-A6C6-A8EE-BDD9A7C19D6C}"/>
+              </a:ext>
+            </a:extLst>
+          </p:cNvPr>
+          <p:cNvSpPr/>
+          <p:nvPr/>
+        </p:nvSpPr>
+        <p:spPr>
+          <a:xfrm>
+            <a:off x="3300248" y="5549468"/>
+            <a:ext cx="704193" cy="704193"/>
+          </a:xfrm>
+          <a:prstGeom prst="roundRect">
+            <a:avLst/>
+          </a:prstGeom>
+        </p:spPr>
+        <p:style>
+          <a:lnRef idx="2">
+            <a:schemeClr val="accent6"/>
+          </a:lnRef>
+          <a:fillRef idx="1">
+            <a:schemeClr val="lt1"/>
+          </a:fillRef>
+          <a:effectRef idx="0">
+            <a:schemeClr val="accent6"/>
+          </a:effectRef>
+          <a:fontRef idx="minor">
+            <a:schemeClr val="dk1"/>
+          </a:fontRef>
+        </p:style>
+        <p:txBody>
+          <a:bodyPr rtlCol="0" anchor="ctr"/>
+          <a:lstStyle/>
+          <a:p>
+            <a:pPr algn="ctr"/>
+            <a:endParaRPr lang="ko-KR" altLang="en-US"/>
+          </a:p>
+        </p:txBody>
+      </p:sp>
+      <p:pic>
+        <p:nvPicPr>
+          <p:cNvPr id="19" name="그래픽 18" descr="약 단색으로 채워진">
+            <a:extLst>
+              <a:ext uri="{FF2B5EF4-FFF2-40B4-BE49-F238E27FC236}">
+                <a16:creationId xmlns:a16="http://schemas.microsoft.com/office/drawing/2014/main" id="{2B5D514D-E78B-5299-6FAB-78644E99D194}"/>
+              </a:ext>
+            </a:extLst>
+          </p:cNvPr>
+          <p:cNvPicPr>
+            <a:picLocks noChangeAspect="1"/>
+          </p:cNvPicPr>
+          <p:nvPr/>
+        </p:nvPicPr>
+        <p:blipFill>
+          <a:blip r:embed="rId2">
+            <a:extLst>
+              <a:ext uri="{96DAC541-7B7A-43D3-8B79-37D633B846F1}">
+                <asvg:svgBlip xmlns:asvg="http://schemas.microsoft.com/office/drawing/2016/SVG/main" r:embed="rId3"/>
+              </a:ext>
+            </a:extLst>
+          </a:blip>
+          <a:stretch>
+            <a:fillRect/>
+          </a:stretch>
+        </p:blipFill>
+        <p:spPr>
+          <a:xfrm>
+            <a:off x="3365937" y="5615157"/>
+            <a:ext cx="572814" cy="572814"/>
+          </a:xfrm>
+          <a:prstGeom prst="rect">
+            <a:avLst/>
+          </a:prstGeom>
+        </p:spPr>
+      </p:pic>
+    </p:spTree>
+    <p:extLst>
+      <p:ext uri="{BB962C8B-B14F-4D97-AF65-F5344CB8AC3E}">
+        <p14:creationId xmlns:p14="http://schemas.microsoft.com/office/powerpoint/2010/main" val="3064327778"/>
       </p:ext>
     </p:extLst>
   </p:cSld>

</xml_diff>